<commit_message>
Sprint 1 Architecture edit
</commit_message>
<xml_diff>
--- a/Sprint1Edited.pptx
+++ b/Sprint1Edited.pptx
@@ -124,7 +124,7 @@
   </p:defaultTextStyle>
   <p:extLst>
     <p:ext uri="{EFAFB233-063F-42B5-8137-9DF3F51BA10A}">
-      <p15:sldGuideLst xmlns:p15="http://schemas.microsoft.com/office/powerpoint/2012/main">
+      <p15:sldGuideLst xmlns:p15="http://schemas.microsoft.com/office/powerpoint/2012/main" xmlns="">
         <p15:guide id="1" orient="horz" pos="2160">
           <p15:clr>
             <a:srgbClr val="A4A3A4"/>
@@ -138,7 +138,7 @@
       </p15:sldGuideLst>
     </p:ext>
     <p:ext uri="{2D200454-40CA-4A62-9FC3-DE9A4176ACB9}">
-      <p15:notesGuideLst xmlns:p15="http://schemas.microsoft.com/office/powerpoint/2012/main"/>
+      <p15:notesGuideLst xmlns:p15="http://schemas.microsoft.com/office/powerpoint/2012/main" xmlns=""/>
     </p:ext>
   </p:extLst>
 </p:presentation>
@@ -3892,7 +3892,7 @@
   <p:timing>
     <p:tnLst>
       <p:par>
-        <p:cTn id="1" dur="indefinite" restart="never" nodeType="tmRoot"/>
+        <p:cTn xmlns:p14="http://schemas.microsoft.com/office/powerpoint/2010/main" id="1" dur="indefinite" restart="never" nodeType="tmRoot"/>
       </p:par>
     </p:tnLst>
   </p:timing>
@@ -4275,7 +4275,7 @@
   <p:timing>
     <p:tnLst>
       <p:par>
-        <p:cTn id="1" dur="indefinite" restart="never" nodeType="tmRoot"/>
+        <p:cTn xmlns:p14="http://schemas.microsoft.com/office/powerpoint/2010/main" id="1" dur="indefinite" restart="never" nodeType="tmRoot"/>
       </p:par>
     </p:tnLst>
   </p:timing>
@@ -4406,15 +4406,7 @@
           <a:p>
             <a:r>
               <a:rPr lang="en-US" dirty="0" smtClean="0"/>
-              <a:t>April </a:t>
-            </a:r>
-            <a:r>
-              <a:rPr lang="en-US" dirty="0" smtClean="0"/>
-              <a:t>19, </a:t>
-            </a:r>
-            <a:r>
-              <a:rPr lang="en-US" dirty="0" smtClean="0"/>
-              <a:t>2017</a:t>
+              <a:t>April 19, 2017</a:t>
             </a:r>
             <a:endParaRPr lang="en-US" dirty="0"/>
           </a:p>
@@ -4475,7 +4467,7 @@
   <p:timing>
     <p:tnLst>
       <p:par>
-        <p:cTn id="1" dur="indefinite" restart="never" nodeType="tmRoot"/>
+        <p:cTn xmlns:p14="http://schemas.microsoft.com/office/powerpoint/2010/main" id="1" dur="indefinite" restart="never" nodeType="tmRoot"/>
       </p:par>
     </p:tnLst>
   </p:timing>
@@ -4546,17 +4538,8 @@
             <a:pPr lvl="1"/>
             <a:r>
               <a:rPr lang="en-US" dirty="0" smtClean="0"/>
-              <a:t>Denial of </a:t>
-            </a:r>
-            <a:r>
-              <a:rPr lang="en-US" dirty="0" smtClean="0"/>
-              <a:t>service</a:t>
-            </a:r>
-            <a:r>
-              <a:rPr lang="en-US" dirty="0" smtClean="0"/>
-              <a:t>. </a:t>
-            </a:r>
-            <a:endParaRPr lang="en-US" dirty="0" smtClean="0"/>
+              <a:t>Denial of service. </a:t>
+            </a:r>
           </a:p>
         </p:txBody>
       </p:sp>
@@ -4614,15 +4597,7 @@
           <a:p>
             <a:r>
               <a:rPr lang="en-US" dirty="0" smtClean="0"/>
-              <a:t>April </a:t>
-            </a:r>
-            <a:r>
-              <a:rPr lang="en-US" dirty="0" smtClean="0"/>
-              <a:t>19, </a:t>
-            </a:r>
-            <a:r>
-              <a:rPr lang="en-US" dirty="0" smtClean="0"/>
-              <a:t>2017</a:t>
+              <a:t>April 19, 2017</a:t>
             </a:r>
             <a:endParaRPr lang="en-US" dirty="0"/>
           </a:p>
@@ -4683,7 +4658,7 @@
   <p:timing>
     <p:tnLst>
       <p:par>
-        <p:cTn id="1" dur="indefinite" restart="never" nodeType="tmRoot"/>
+        <p:cTn xmlns:p14="http://schemas.microsoft.com/office/powerpoint/2010/main" id="1" dur="indefinite" restart="never" nodeType="tmRoot"/>
       </p:par>
     </p:tnLst>
   </p:timing>
@@ -4842,7 +4817,7 @@
   <p:timing>
     <p:tnLst>
       <p:par>
-        <p:cTn id="1" dur="indefinite" restart="never" nodeType="tmRoot"/>
+        <p:cTn xmlns:p14="http://schemas.microsoft.com/office/powerpoint/2010/main" id="1" dur="indefinite" restart="never" nodeType="tmRoot"/>
       </p:par>
     </p:tnLst>
   </p:timing>
@@ -4943,15 +4918,7 @@
           <a:p>
             <a:r>
               <a:rPr lang="en-US" dirty="0" smtClean="0"/>
-              <a:t>April </a:t>
-            </a:r>
-            <a:r>
-              <a:rPr lang="en-US" dirty="0" smtClean="0"/>
-              <a:t>19, </a:t>
-            </a:r>
-            <a:r>
-              <a:rPr lang="en-US" dirty="0" smtClean="0"/>
-              <a:t>2017</a:t>
+              <a:t>April 19, 2017</a:t>
             </a:r>
             <a:endParaRPr lang="en-US" dirty="0"/>
           </a:p>
@@ -5015,21 +4982,21 @@
                 <a:gridCol w="4038600">
                   <a:extLst>
                     <a:ext uri="{9D8B030D-6E8A-4147-A177-3AD203B41FA5}">
-                      <a16:colId xmlns:a16="http://schemas.microsoft.com/office/drawing/2014/main" xmlns="" val="20000"/>
+                      <a16:colId xmlns="" xmlns:a16="http://schemas.microsoft.com/office/drawing/2014/main" val="20000"/>
                     </a:ext>
                   </a:extLst>
                 </a:gridCol>
                 <a:gridCol w="3276600">
                   <a:extLst>
                     <a:ext uri="{9D8B030D-6E8A-4147-A177-3AD203B41FA5}">
-                      <a16:colId xmlns:a16="http://schemas.microsoft.com/office/drawing/2014/main" xmlns="" val="20001"/>
+                      <a16:colId xmlns="" xmlns:a16="http://schemas.microsoft.com/office/drawing/2014/main" val="20001"/>
                     </a:ext>
                   </a:extLst>
                 </a:gridCol>
                 <a:gridCol w="3657600">
                   <a:extLst>
                     <a:ext uri="{9D8B030D-6E8A-4147-A177-3AD203B41FA5}">
-                      <a16:colId xmlns:a16="http://schemas.microsoft.com/office/drawing/2014/main" xmlns="" val="20002"/>
+                      <a16:colId xmlns="" xmlns:a16="http://schemas.microsoft.com/office/drawing/2014/main" val="20002"/>
                     </a:ext>
                   </a:extLst>
                 </a:gridCol>
@@ -5076,7 +5043,7 @@
                 </a:tc>
                 <a:extLst>
                   <a:ext uri="{0D108BD9-81ED-4DB2-BD59-A6C34878D82A}">
-                    <a16:rowId xmlns:a16="http://schemas.microsoft.com/office/drawing/2014/main" xmlns="" val="10000"/>
+                    <a16:rowId xmlns="" xmlns:a16="http://schemas.microsoft.com/office/drawing/2014/main" val="10000"/>
                   </a:ext>
                 </a:extLst>
               </a:tr>
@@ -5123,7 +5090,7 @@
                 </a:tc>
                 <a:extLst>
                   <a:ext uri="{0D108BD9-81ED-4DB2-BD59-A6C34878D82A}">
-                    <a16:rowId xmlns:a16="http://schemas.microsoft.com/office/drawing/2014/main" xmlns="" val="10001"/>
+                    <a16:rowId xmlns="" xmlns:a16="http://schemas.microsoft.com/office/drawing/2014/main" val="10001"/>
                   </a:ext>
                 </a:extLst>
               </a:tr>
@@ -5174,7 +5141,7 @@
                 </a:tc>
                 <a:extLst>
                   <a:ext uri="{0D108BD9-81ED-4DB2-BD59-A6C34878D82A}">
-                    <a16:rowId xmlns:a16="http://schemas.microsoft.com/office/drawing/2014/main" xmlns="" val="10002"/>
+                    <a16:rowId xmlns="" xmlns:a16="http://schemas.microsoft.com/office/drawing/2014/main" val="10002"/>
                   </a:ext>
                 </a:extLst>
               </a:tr>
@@ -5225,7 +5192,7 @@
                 </a:tc>
                 <a:extLst>
                   <a:ext uri="{0D108BD9-81ED-4DB2-BD59-A6C34878D82A}">
-                    <a16:rowId xmlns:a16="http://schemas.microsoft.com/office/drawing/2014/main" xmlns="" val="10003"/>
+                    <a16:rowId xmlns="" xmlns:a16="http://schemas.microsoft.com/office/drawing/2014/main" val="10003"/>
                   </a:ext>
                 </a:extLst>
               </a:tr>
@@ -5258,7 +5225,7 @@
   <p:timing>
     <p:tnLst>
       <p:par>
-        <p:cTn id="1" dur="indefinite" restart="never" nodeType="tmRoot"/>
+        <p:cTn xmlns:p14="http://schemas.microsoft.com/office/powerpoint/2010/main" id="1" dur="indefinite" restart="never" nodeType="tmRoot"/>
       </p:par>
     </p:tnLst>
   </p:timing>
@@ -5466,15 +5433,7 @@
           <a:p>
             <a:r>
               <a:rPr lang="en-US" dirty="0" smtClean="0"/>
-              <a:t>April </a:t>
-            </a:r>
-            <a:r>
-              <a:rPr lang="en-US" dirty="0" smtClean="0"/>
-              <a:t>19, </a:t>
-            </a:r>
-            <a:r>
-              <a:rPr lang="en-US" dirty="0" smtClean="0"/>
-              <a:t>2017</a:t>
+              <a:t>April 19, 2017</a:t>
             </a:r>
             <a:endParaRPr lang="en-US" dirty="0"/>
           </a:p>
@@ -5505,7 +5464,7 @@
   <p:timing>
     <p:tnLst>
       <p:par>
-        <p:cTn id="1" dur="indefinite" restart="never" nodeType="tmRoot"/>
+        <p:cTn xmlns:p14="http://schemas.microsoft.com/office/powerpoint/2010/main" id="1" dur="indefinite" restart="never" nodeType="tmRoot"/>
       </p:par>
     </p:tnLst>
   </p:timing>
@@ -5641,15 +5600,7 @@
           <a:p>
             <a:r>
               <a:rPr lang="en-US" dirty="0" smtClean="0"/>
-              <a:t>April </a:t>
-            </a:r>
-            <a:r>
-              <a:rPr lang="en-US" dirty="0" smtClean="0"/>
-              <a:t>19, </a:t>
-            </a:r>
-            <a:r>
-              <a:rPr lang="en-US" dirty="0" smtClean="0"/>
-              <a:t>2017</a:t>
+              <a:t>April 19, 2017</a:t>
             </a:r>
             <a:endParaRPr lang="en-US" dirty="0"/>
           </a:p>
@@ -5710,7 +5661,7 @@
   <p:timing>
     <p:tnLst>
       <p:par>
-        <p:cTn id="1" dur="indefinite" restart="never" nodeType="tmRoot"/>
+        <p:cTn xmlns:p14="http://schemas.microsoft.com/office/powerpoint/2010/main" id="1" dur="indefinite" restart="never" nodeType="tmRoot"/>
       </p:par>
     </p:tnLst>
   </p:timing>
@@ -5786,14 +5737,14 @@
                 <a:gridCol w="5486400">
                   <a:extLst>
                     <a:ext uri="{9D8B030D-6E8A-4147-A177-3AD203B41FA5}">
-                      <a16:colId xmlns:a16="http://schemas.microsoft.com/office/drawing/2014/main" xmlns="" val="4024214062"/>
+                      <a16:colId xmlns="" xmlns:a16="http://schemas.microsoft.com/office/drawing/2014/main" val="4024214062"/>
                     </a:ext>
                   </a:extLst>
                 </a:gridCol>
                 <a:gridCol w="5486400">
                   <a:extLst>
                     <a:ext uri="{9D8B030D-6E8A-4147-A177-3AD203B41FA5}">
-                      <a16:colId xmlns:a16="http://schemas.microsoft.com/office/drawing/2014/main" xmlns="" val="1838665537"/>
+                      <a16:colId xmlns="" xmlns:a16="http://schemas.microsoft.com/office/drawing/2014/main" val="1838665537"/>
                     </a:ext>
                   </a:extLst>
                 </a:gridCol>
@@ -5829,7 +5780,7 @@
                 </a:tc>
                 <a:extLst>
                   <a:ext uri="{0D108BD9-81ED-4DB2-BD59-A6C34878D82A}">
-                    <a16:rowId xmlns:a16="http://schemas.microsoft.com/office/drawing/2014/main" xmlns="" val="986279335"/>
+                    <a16:rowId xmlns="" xmlns:a16="http://schemas.microsoft.com/office/drawing/2014/main" val="986279335"/>
                   </a:ext>
                 </a:extLst>
               </a:tr>
@@ -5860,7 +5811,7 @@
                 </a:tc>
                 <a:extLst>
                   <a:ext uri="{0D108BD9-81ED-4DB2-BD59-A6C34878D82A}">
-                    <a16:rowId xmlns:a16="http://schemas.microsoft.com/office/drawing/2014/main" xmlns="" val="2649700066"/>
+                    <a16:rowId xmlns="" xmlns:a16="http://schemas.microsoft.com/office/drawing/2014/main" val="2649700066"/>
                   </a:ext>
                 </a:extLst>
               </a:tr>
@@ -5895,7 +5846,7 @@
                 </a:tc>
                 <a:extLst>
                   <a:ext uri="{0D108BD9-81ED-4DB2-BD59-A6C34878D82A}">
-                    <a16:rowId xmlns:a16="http://schemas.microsoft.com/office/drawing/2014/main" xmlns="" val="3650691391"/>
+                    <a16:rowId xmlns="" xmlns:a16="http://schemas.microsoft.com/office/drawing/2014/main" val="3650691391"/>
                   </a:ext>
                 </a:extLst>
               </a:tr>
@@ -5930,7 +5881,7 @@
                 </a:tc>
                 <a:extLst>
                   <a:ext uri="{0D108BD9-81ED-4DB2-BD59-A6C34878D82A}">
-                    <a16:rowId xmlns:a16="http://schemas.microsoft.com/office/drawing/2014/main" xmlns="" val="3717878835"/>
+                    <a16:rowId xmlns="" xmlns:a16="http://schemas.microsoft.com/office/drawing/2014/main" val="3717878835"/>
                   </a:ext>
                 </a:extLst>
               </a:tr>
@@ -5965,7 +5916,7 @@
                 </a:tc>
                 <a:extLst>
                   <a:ext uri="{0D108BD9-81ED-4DB2-BD59-A6C34878D82A}">
-                    <a16:rowId xmlns:a16="http://schemas.microsoft.com/office/drawing/2014/main" xmlns="" val="207666318"/>
+                    <a16:rowId xmlns="" xmlns:a16="http://schemas.microsoft.com/office/drawing/2014/main" val="207666318"/>
                   </a:ext>
                 </a:extLst>
               </a:tr>
@@ -6000,7 +5951,7 @@
                 </a:tc>
                 <a:extLst>
                   <a:ext uri="{0D108BD9-81ED-4DB2-BD59-A6C34878D82A}">
-                    <a16:rowId xmlns:a16="http://schemas.microsoft.com/office/drawing/2014/main" xmlns="" val="4219954106"/>
+                    <a16:rowId xmlns="" xmlns:a16="http://schemas.microsoft.com/office/drawing/2014/main" val="4219954106"/>
                   </a:ext>
                 </a:extLst>
               </a:tr>
@@ -6034,7 +5985,7 @@
                 </a:tc>
                 <a:extLst>
                   <a:ext uri="{0D108BD9-81ED-4DB2-BD59-A6C34878D82A}">
-                    <a16:rowId xmlns:a16="http://schemas.microsoft.com/office/drawing/2014/main" xmlns="" val="2041197959"/>
+                    <a16:rowId xmlns="" xmlns:a16="http://schemas.microsoft.com/office/drawing/2014/main" val="2041197959"/>
                   </a:ext>
                 </a:extLst>
               </a:tr>
@@ -6068,7 +6019,7 @@
                 </a:tc>
                 <a:extLst>
                   <a:ext uri="{0D108BD9-81ED-4DB2-BD59-A6C34878D82A}">
-                    <a16:rowId xmlns:a16="http://schemas.microsoft.com/office/drawing/2014/main" xmlns="" val="1620820458"/>
+                    <a16:rowId xmlns="" xmlns:a16="http://schemas.microsoft.com/office/drawing/2014/main" val="1620820458"/>
                   </a:ext>
                 </a:extLst>
               </a:tr>
@@ -6160,15 +6111,7 @@
           <a:p>
             <a:r>
               <a:rPr lang="en-US" dirty="0" smtClean="0"/>
-              <a:t>April </a:t>
-            </a:r>
-            <a:r>
-              <a:rPr lang="en-US" dirty="0" smtClean="0"/>
-              <a:t>19, </a:t>
-            </a:r>
-            <a:r>
-              <a:rPr lang="en-US" dirty="0" smtClean="0"/>
-              <a:t>2017</a:t>
+              <a:t>April 19, 2017</a:t>
             </a:r>
             <a:endParaRPr lang="en-US" dirty="0"/>
           </a:p>
@@ -6199,7 +6142,7 @@
   <p:timing>
     <p:tnLst>
       <p:par>
-        <p:cTn id="1" dur="indefinite" restart="never" nodeType="tmRoot"/>
+        <p:cTn xmlns:p14="http://schemas.microsoft.com/office/powerpoint/2010/main" id="1" dur="indefinite" restart="never" nodeType="tmRoot"/>
       </p:par>
     </p:tnLst>
   </p:timing>
@@ -6275,14 +6218,14 @@
                 <a:gridCol w="5486400">
                   <a:extLst>
                     <a:ext uri="{9D8B030D-6E8A-4147-A177-3AD203B41FA5}">
-                      <a16:colId xmlns:a16="http://schemas.microsoft.com/office/drawing/2014/main" xmlns="" val="4024214062"/>
+                      <a16:colId xmlns="" xmlns:a16="http://schemas.microsoft.com/office/drawing/2014/main" val="4024214062"/>
                     </a:ext>
                   </a:extLst>
                 </a:gridCol>
                 <a:gridCol w="5486400">
                   <a:extLst>
                     <a:ext uri="{9D8B030D-6E8A-4147-A177-3AD203B41FA5}">
-                      <a16:colId xmlns:a16="http://schemas.microsoft.com/office/drawing/2014/main" xmlns="" val="1838665537"/>
+                      <a16:colId xmlns="" xmlns:a16="http://schemas.microsoft.com/office/drawing/2014/main" val="1838665537"/>
                     </a:ext>
                   </a:extLst>
                 </a:gridCol>
@@ -6314,7 +6257,7 @@
                 </a:tc>
                 <a:extLst>
                   <a:ext uri="{0D108BD9-81ED-4DB2-BD59-A6C34878D82A}">
-                    <a16:rowId xmlns:a16="http://schemas.microsoft.com/office/drawing/2014/main" xmlns="" val="986279335"/>
+                    <a16:rowId xmlns="" xmlns:a16="http://schemas.microsoft.com/office/drawing/2014/main" val="986279335"/>
                   </a:ext>
                 </a:extLst>
               </a:tr>
@@ -6345,7 +6288,7 @@
                 </a:tc>
                 <a:extLst>
                   <a:ext uri="{0D108BD9-81ED-4DB2-BD59-A6C34878D82A}">
-                    <a16:rowId xmlns:a16="http://schemas.microsoft.com/office/drawing/2014/main" xmlns="" val="2649700066"/>
+                    <a16:rowId xmlns="" xmlns:a16="http://schemas.microsoft.com/office/drawing/2014/main" val="2649700066"/>
                   </a:ext>
                 </a:extLst>
               </a:tr>
@@ -6380,7 +6323,7 @@
                 </a:tc>
                 <a:extLst>
                   <a:ext uri="{0D108BD9-81ED-4DB2-BD59-A6C34878D82A}">
-                    <a16:rowId xmlns:a16="http://schemas.microsoft.com/office/drawing/2014/main" xmlns="" val="309961168"/>
+                    <a16:rowId xmlns="" xmlns:a16="http://schemas.microsoft.com/office/drawing/2014/main" val="309961168"/>
                   </a:ext>
                 </a:extLst>
               </a:tr>
@@ -6415,7 +6358,7 @@
                 </a:tc>
                 <a:extLst>
                   <a:ext uri="{0D108BD9-81ED-4DB2-BD59-A6C34878D82A}">
-                    <a16:rowId xmlns:a16="http://schemas.microsoft.com/office/drawing/2014/main" xmlns="" val="1746750848"/>
+                    <a16:rowId xmlns="" xmlns:a16="http://schemas.microsoft.com/office/drawing/2014/main" val="1746750848"/>
                   </a:ext>
                 </a:extLst>
               </a:tr>
@@ -6450,7 +6393,7 @@
                 </a:tc>
                 <a:extLst>
                   <a:ext uri="{0D108BD9-81ED-4DB2-BD59-A6C34878D82A}">
-                    <a16:rowId xmlns:a16="http://schemas.microsoft.com/office/drawing/2014/main" xmlns="" val="2287252683"/>
+                    <a16:rowId xmlns="" xmlns:a16="http://schemas.microsoft.com/office/drawing/2014/main" val="2287252683"/>
                   </a:ext>
                 </a:extLst>
               </a:tr>
@@ -6485,7 +6428,7 @@
                 </a:tc>
                 <a:extLst>
                   <a:ext uri="{0D108BD9-81ED-4DB2-BD59-A6C34878D82A}">
-                    <a16:rowId xmlns:a16="http://schemas.microsoft.com/office/drawing/2014/main" xmlns="" val="3931255069"/>
+                    <a16:rowId xmlns="" xmlns:a16="http://schemas.microsoft.com/office/drawing/2014/main" val="3931255069"/>
                   </a:ext>
                 </a:extLst>
               </a:tr>
@@ -6577,15 +6520,7 @@
           <a:p>
             <a:r>
               <a:rPr lang="en-US" dirty="0" smtClean="0"/>
-              <a:t>April </a:t>
-            </a:r>
-            <a:r>
-              <a:rPr lang="en-US" dirty="0" smtClean="0"/>
-              <a:t>19, </a:t>
-            </a:r>
-            <a:r>
-              <a:rPr lang="en-US" dirty="0" smtClean="0"/>
-              <a:t>2017</a:t>
+              <a:t>April 19, 2017</a:t>
             </a:r>
             <a:endParaRPr lang="en-US" dirty="0"/>
           </a:p>
@@ -6616,7 +6551,7 @@
   <p:timing>
     <p:tnLst>
       <p:par>
-        <p:cTn id="1" dur="indefinite" restart="never" nodeType="tmRoot"/>
+        <p:cTn xmlns:p14="http://schemas.microsoft.com/office/powerpoint/2010/main" id="1" dur="indefinite" restart="never" nodeType="tmRoot"/>
       </p:par>
     </p:tnLst>
   </p:timing>
@@ -6692,14 +6627,14 @@
                 <a:gridCol w="5486400">
                   <a:extLst>
                     <a:ext uri="{9D8B030D-6E8A-4147-A177-3AD203B41FA5}">
-                      <a16:colId xmlns:a16="http://schemas.microsoft.com/office/drawing/2014/main" xmlns="" val="3661438328"/>
+                      <a16:colId xmlns="" xmlns:a16="http://schemas.microsoft.com/office/drawing/2014/main" val="3661438328"/>
                     </a:ext>
                   </a:extLst>
                 </a:gridCol>
                 <a:gridCol w="5486400">
                   <a:extLst>
                     <a:ext uri="{9D8B030D-6E8A-4147-A177-3AD203B41FA5}">
-                      <a16:colId xmlns:a16="http://schemas.microsoft.com/office/drawing/2014/main" xmlns="" val="2462084561"/>
+                      <a16:colId xmlns="" xmlns:a16="http://schemas.microsoft.com/office/drawing/2014/main" val="2462084561"/>
                     </a:ext>
                   </a:extLst>
                 </a:gridCol>
@@ -6735,7 +6670,7 @@
                 </a:tc>
                 <a:extLst>
                   <a:ext uri="{0D108BD9-81ED-4DB2-BD59-A6C34878D82A}">
-                    <a16:rowId xmlns:a16="http://schemas.microsoft.com/office/drawing/2014/main" xmlns="" val="2830022487"/>
+                    <a16:rowId xmlns="" xmlns:a16="http://schemas.microsoft.com/office/drawing/2014/main" val="2830022487"/>
                   </a:ext>
                 </a:extLst>
               </a:tr>
@@ -6770,7 +6705,7 @@
                 </a:tc>
                 <a:extLst>
                   <a:ext uri="{0D108BD9-81ED-4DB2-BD59-A6C34878D82A}">
-                    <a16:rowId xmlns:a16="http://schemas.microsoft.com/office/drawing/2014/main" xmlns="" val="3462792300"/>
+                    <a16:rowId xmlns="" xmlns:a16="http://schemas.microsoft.com/office/drawing/2014/main" val="3462792300"/>
                   </a:ext>
                 </a:extLst>
               </a:tr>
@@ -6813,7 +6748,7 @@
                 </a:tc>
                 <a:extLst>
                   <a:ext uri="{0D108BD9-81ED-4DB2-BD59-A6C34878D82A}">
-                    <a16:rowId xmlns:a16="http://schemas.microsoft.com/office/drawing/2014/main" xmlns="" val="3061581558"/>
+                    <a16:rowId xmlns="" xmlns:a16="http://schemas.microsoft.com/office/drawing/2014/main" val="3061581558"/>
                   </a:ext>
                 </a:extLst>
               </a:tr>
@@ -6852,7 +6787,7 @@
                 </a:tc>
                 <a:extLst>
                   <a:ext uri="{0D108BD9-81ED-4DB2-BD59-A6C34878D82A}">
-                    <a16:rowId xmlns:a16="http://schemas.microsoft.com/office/drawing/2014/main" xmlns="" val="742086977"/>
+                    <a16:rowId xmlns="" xmlns:a16="http://schemas.microsoft.com/office/drawing/2014/main" val="742086977"/>
                   </a:ext>
                 </a:extLst>
               </a:tr>
@@ -6887,7 +6822,7 @@
                 </a:tc>
                 <a:extLst>
                   <a:ext uri="{0D108BD9-81ED-4DB2-BD59-A6C34878D82A}">
-                    <a16:rowId xmlns:a16="http://schemas.microsoft.com/office/drawing/2014/main" xmlns="" val="2361850435"/>
+                    <a16:rowId xmlns="" xmlns:a16="http://schemas.microsoft.com/office/drawing/2014/main" val="2361850435"/>
                   </a:ext>
                 </a:extLst>
               </a:tr>
@@ -6926,7 +6861,7 @@
                 </a:tc>
                 <a:extLst>
                   <a:ext uri="{0D108BD9-81ED-4DB2-BD59-A6C34878D82A}">
-                    <a16:rowId xmlns:a16="http://schemas.microsoft.com/office/drawing/2014/main" xmlns="" val="2876776749"/>
+                    <a16:rowId xmlns="" xmlns:a16="http://schemas.microsoft.com/office/drawing/2014/main" val="2876776749"/>
                   </a:ext>
                 </a:extLst>
               </a:tr>
@@ -6965,7 +6900,7 @@
                 </a:tc>
                 <a:extLst>
                   <a:ext uri="{0D108BD9-81ED-4DB2-BD59-A6C34878D82A}">
-                    <a16:rowId xmlns:a16="http://schemas.microsoft.com/office/drawing/2014/main" xmlns="" val="2847548840"/>
+                    <a16:rowId xmlns="" xmlns:a16="http://schemas.microsoft.com/office/drawing/2014/main" val="2847548840"/>
                   </a:ext>
                 </a:extLst>
               </a:tr>
@@ -7057,15 +6992,7 @@
           <a:p>
             <a:r>
               <a:rPr lang="en-US" dirty="0" smtClean="0"/>
-              <a:t>April </a:t>
-            </a:r>
-            <a:r>
-              <a:rPr lang="en-US" dirty="0" smtClean="0"/>
-              <a:t>19, </a:t>
-            </a:r>
-            <a:r>
-              <a:rPr lang="en-US" dirty="0" smtClean="0"/>
-              <a:t>2017</a:t>
+              <a:t>April 19, 2017</a:t>
             </a:r>
             <a:endParaRPr lang="en-US" dirty="0"/>
           </a:p>
@@ -7096,7 +7023,7 @@
   <p:timing>
     <p:tnLst>
       <p:par>
-        <p:cTn id="1" dur="indefinite" restart="never" nodeType="tmRoot"/>
+        <p:cTn xmlns:p14="http://schemas.microsoft.com/office/powerpoint/2010/main" id="1" dur="indefinite" restart="never" nodeType="tmRoot"/>
       </p:par>
     </p:tnLst>
   </p:timing>
@@ -7160,7 +7087,7 @@
         </p:nvGraphicFramePr>
         <p:xfrm>
           <a:off x="609600" y="1600200"/>
-          <a:ext cx="10972800" cy="4119880"/>
+          <a:ext cx="10972800" cy="4119879"/>
         </p:xfrm>
         <a:graphic>
           <a:graphicData uri="http://schemas.openxmlformats.org/drawingml/2006/table">
@@ -7172,28 +7099,28 @@
                 <a:gridCol w="2743200">
                   <a:extLst>
                     <a:ext uri="{9D8B030D-6E8A-4147-A177-3AD203B41FA5}">
-                      <a16:colId xmlns:a16="http://schemas.microsoft.com/office/drawing/2014/main" xmlns="" val="4007007747"/>
+                      <a16:colId xmlns="" xmlns:a16="http://schemas.microsoft.com/office/drawing/2014/main" val="4007007747"/>
                     </a:ext>
                   </a:extLst>
                 </a:gridCol>
                 <a:gridCol w="2743200">
                   <a:extLst>
                     <a:ext uri="{9D8B030D-6E8A-4147-A177-3AD203B41FA5}">
-                      <a16:colId xmlns:a16="http://schemas.microsoft.com/office/drawing/2014/main" xmlns="" val="2089765381"/>
+                      <a16:colId xmlns="" xmlns:a16="http://schemas.microsoft.com/office/drawing/2014/main" val="2089765381"/>
                     </a:ext>
                   </a:extLst>
                 </a:gridCol>
                 <a:gridCol w="2743200">
                   <a:extLst>
                     <a:ext uri="{9D8B030D-6E8A-4147-A177-3AD203B41FA5}">
-                      <a16:colId xmlns:a16="http://schemas.microsoft.com/office/drawing/2014/main" xmlns="" val="2946535250"/>
+                      <a16:colId xmlns="" xmlns:a16="http://schemas.microsoft.com/office/drawing/2014/main" val="2946535250"/>
                     </a:ext>
                   </a:extLst>
                 </a:gridCol>
                 <a:gridCol w="2743200">
                   <a:extLst>
                     <a:ext uri="{9D8B030D-6E8A-4147-A177-3AD203B41FA5}">
-                      <a16:colId xmlns:a16="http://schemas.microsoft.com/office/drawing/2014/main" xmlns="" val="2232881725"/>
+                      <a16:colId xmlns="" xmlns:a16="http://schemas.microsoft.com/office/drawing/2014/main" val="2232881725"/>
                     </a:ext>
                   </a:extLst>
                 </a:gridCol>
@@ -7257,7 +7184,7 @@
                 </a:tc>
                 <a:extLst>
                   <a:ext uri="{0D108BD9-81ED-4DB2-BD59-A6C34878D82A}">
-                    <a16:rowId xmlns:a16="http://schemas.microsoft.com/office/drawing/2014/main" xmlns="" val="2585052838"/>
+                    <a16:rowId xmlns="" xmlns:a16="http://schemas.microsoft.com/office/drawing/2014/main" val="2585052838"/>
                   </a:ext>
                 </a:extLst>
               </a:tr>
@@ -7333,7 +7260,7 @@
                 </a:tc>
                 <a:extLst>
                   <a:ext uri="{0D108BD9-81ED-4DB2-BD59-A6C34878D82A}">
-                    <a16:rowId xmlns:a16="http://schemas.microsoft.com/office/drawing/2014/main" xmlns="" val="1152342311"/>
+                    <a16:rowId xmlns="" xmlns:a16="http://schemas.microsoft.com/office/drawing/2014/main" val="1152342311"/>
                   </a:ext>
                 </a:extLst>
               </a:tr>
@@ -7400,7 +7327,7 @@
                 </a:tc>
                 <a:extLst>
                   <a:ext uri="{0D108BD9-81ED-4DB2-BD59-A6C34878D82A}">
-                    <a16:rowId xmlns:a16="http://schemas.microsoft.com/office/drawing/2014/main" xmlns="" val="10002"/>
+                    <a16:rowId xmlns="" xmlns:a16="http://schemas.microsoft.com/office/drawing/2014/main" val="10002"/>
                   </a:ext>
                 </a:extLst>
               </a:tr>
@@ -7461,7 +7388,7 @@
                 </a:tc>
                 <a:extLst>
                   <a:ext uri="{0D108BD9-81ED-4DB2-BD59-A6C34878D82A}">
-                    <a16:rowId xmlns:a16="http://schemas.microsoft.com/office/drawing/2014/main" xmlns="" val="10003"/>
+                    <a16:rowId xmlns="" xmlns:a16="http://schemas.microsoft.com/office/drawing/2014/main" val="10003"/>
                   </a:ext>
                 </a:extLst>
               </a:tr>
@@ -7528,7 +7455,7 @@
                 </a:tc>
                 <a:extLst>
                   <a:ext uri="{0D108BD9-81ED-4DB2-BD59-A6C34878D82A}">
-                    <a16:rowId xmlns:a16="http://schemas.microsoft.com/office/drawing/2014/main" xmlns="" val="10004"/>
+                    <a16:rowId xmlns="" xmlns:a16="http://schemas.microsoft.com/office/drawing/2014/main" val="10004"/>
                   </a:ext>
                 </a:extLst>
               </a:tr>
@@ -7620,15 +7547,7 @@
           <a:p>
             <a:r>
               <a:rPr lang="en-US" dirty="0" smtClean="0"/>
-              <a:t>April </a:t>
-            </a:r>
-            <a:r>
-              <a:rPr lang="en-US" dirty="0" smtClean="0"/>
-              <a:t>19, </a:t>
-            </a:r>
-            <a:r>
-              <a:rPr lang="en-US" dirty="0" smtClean="0"/>
-              <a:t>2017</a:t>
+              <a:t>April 19, 2017</a:t>
             </a:r>
             <a:endParaRPr lang="en-US" dirty="0"/>
           </a:p>
@@ -7659,7 +7578,7 @@
   <p:timing>
     <p:tnLst>
       <p:par>
-        <p:cTn id="1" dur="indefinite" restart="never" nodeType="tmRoot"/>
+        <p:cTn xmlns:p14="http://schemas.microsoft.com/office/powerpoint/2010/main" id="1" dur="indefinite" restart="never" nodeType="tmRoot"/>
       </p:par>
     </p:tnLst>
   </p:timing>
@@ -7722,7 +7641,7 @@
         </p:nvGraphicFramePr>
         <p:xfrm>
           <a:off x="609600" y="1600200"/>
-          <a:ext cx="10972800" cy="3022600"/>
+          <a:ext cx="10972800" cy="3022599"/>
         </p:xfrm>
         <a:graphic>
           <a:graphicData uri="http://schemas.openxmlformats.org/drawingml/2006/table">
@@ -7734,28 +7653,28 @@
                 <a:gridCol w="2743200">
                   <a:extLst>
                     <a:ext uri="{9D8B030D-6E8A-4147-A177-3AD203B41FA5}">
-                      <a16:colId xmlns:a16="http://schemas.microsoft.com/office/drawing/2014/main" xmlns="" val="4007007747"/>
+                      <a16:colId xmlns="" xmlns:a16="http://schemas.microsoft.com/office/drawing/2014/main" val="4007007747"/>
                     </a:ext>
                   </a:extLst>
                 </a:gridCol>
                 <a:gridCol w="2743200">
                   <a:extLst>
                     <a:ext uri="{9D8B030D-6E8A-4147-A177-3AD203B41FA5}">
-                      <a16:colId xmlns:a16="http://schemas.microsoft.com/office/drawing/2014/main" xmlns="" val="2089765381"/>
+                      <a16:colId xmlns="" xmlns:a16="http://schemas.microsoft.com/office/drawing/2014/main" val="2089765381"/>
                     </a:ext>
                   </a:extLst>
                 </a:gridCol>
                 <a:gridCol w="2743200">
                   <a:extLst>
                     <a:ext uri="{9D8B030D-6E8A-4147-A177-3AD203B41FA5}">
-                      <a16:colId xmlns:a16="http://schemas.microsoft.com/office/drawing/2014/main" xmlns="" val="2946535250"/>
+                      <a16:colId xmlns="" xmlns:a16="http://schemas.microsoft.com/office/drawing/2014/main" val="2946535250"/>
                     </a:ext>
                   </a:extLst>
                 </a:gridCol>
                 <a:gridCol w="2743200">
                   <a:extLst>
                     <a:ext uri="{9D8B030D-6E8A-4147-A177-3AD203B41FA5}">
-                      <a16:colId xmlns:a16="http://schemas.microsoft.com/office/drawing/2014/main" xmlns="" val="2232881725"/>
+                      <a16:colId xmlns="" xmlns:a16="http://schemas.microsoft.com/office/drawing/2014/main" val="2232881725"/>
                     </a:ext>
                   </a:extLst>
                 </a:gridCol>
@@ -7819,7 +7738,7 @@
                 </a:tc>
                 <a:extLst>
                   <a:ext uri="{0D108BD9-81ED-4DB2-BD59-A6C34878D82A}">
-                    <a16:rowId xmlns:a16="http://schemas.microsoft.com/office/drawing/2014/main" xmlns="" val="2585052838"/>
+                    <a16:rowId xmlns="" xmlns:a16="http://schemas.microsoft.com/office/drawing/2014/main" val="2585052838"/>
                   </a:ext>
                 </a:extLst>
               </a:tr>
@@ -7880,7 +7799,7 @@
                 </a:tc>
                 <a:extLst>
                   <a:ext uri="{0D108BD9-81ED-4DB2-BD59-A6C34878D82A}">
-                    <a16:rowId xmlns:a16="http://schemas.microsoft.com/office/drawing/2014/main" xmlns="" val="3714616697"/>
+                    <a16:rowId xmlns="" xmlns:a16="http://schemas.microsoft.com/office/drawing/2014/main" val="3714616697"/>
                   </a:ext>
                 </a:extLst>
               </a:tr>
@@ -7968,7 +7887,7 @@
                 </a:tc>
                 <a:extLst>
                   <a:ext uri="{0D108BD9-81ED-4DB2-BD59-A6C34878D82A}">
-                    <a16:rowId xmlns:a16="http://schemas.microsoft.com/office/drawing/2014/main" xmlns="" val="2564084175"/>
+                    <a16:rowId xmlns="" xmlns:a16="http://schemas.microsoft.com/office/drawing/2014/main" val="2564084175"/>
                   </a:ext>
                 </a:extLst>
               </a:tr>
@@ -8056,7 +7975,7 @@
                 </a:tc>
                 <a:extLst>
                   <a:ext uri="{0D108BD9-81ED-4DB2-BD59-A6C34878D82A}">
-                    <a16:rowId xmlns:a16="http://schemas.microsoft.com/office/drawing/2014/main" xmlns="" val="2775949887"/>
+                    <a16:rowId xmlns="" xmlns:a16="http://schemas.microsoft.com/office/drawing/2014/main" val="2775949887"/>
                   </a:ext>
                 </a:extLst>
               </a:tr>
@@ -8123,7 +8042,7 @@
                 </a:tc>
                 <a:extLst>
                   <a:ext uri="{0D108BD9-81ED-4DB2-BD59-A6C34878D82A}">
-                    <a16:rowId xmlns:a16="http://schemas.microsoft.com/office/drawing/2014/main" xmlns="" val="178318549"/>
+                    <a16:rowId xmlns="" xmlns:a16="http://schemas.microsoft.com/office/drawing/2014/main" val="178318549"/>
                   </a:ext>
                 </a:extLst>
               </a:tr>
@@ -8215,15 +8134,7 @@
           <a:p>
             <a:r>
               <a:rPr lang="en-US" dirty="0" smtClean="0"/>
-              <a:t>April </a:t>
-            </a:r>
-            <a:r>
-              <a:rPr lang="en-US" dirty="0" smtClean="0"/>
-              <a:t>19, </a:t>
-            </a:r>
-            <a:r>
-              <a:rPr lang="en-US" dirty="0" smtClean="0"/>
-              <a:t>2017</a:t>
+              <a:t>April 19, 2017</a:t>
             </a:r>
             <a:endParaRPr lang="en-US" dirty="0"/>
           </a:p>
@@ -8254,7 +8165,7 @@
   <p:timing>
     <p:tnLst>
       <p:par>
-        <p:cTn id="1" dur="indefinite" restart="never" nodeType="tmRoot"/>
+        <p:cTn xmlns:p14="http://schemas.microsoft.com/office/powerpoint/2010/main" id="1" dur="indefinite" restart="never" nodeType="tmRoot"/>
       </p:par>
     </p:tnLst>
   </p:timing>
@@ -8324,163 +8235,179 @@
           <a:lstStyle/>
           <a:p>
             <a:r>
+              <a:rPr lang="en-US" dirty="0" smtClean="0"/>
+              <a:t>Productivity (PROD)</a:t>
+            </a:r>
+          </a:p>
+          <a:p>
+            <a:pPr lvl="1"/>
+            <a:r>
+              <a:rPr lang="en-US" dirty="0" smtClean="0"/>
+              <a:t>PROD estimate is normal (7)</a:t>
+            </a:r>
+          </a:p>
+          <a:p>
+            <a:pPr lvl="1"/>
+            <a:r>
+              <a:rPr lang="en-US" dirty="0" smtClean="0"/>
+              <a:t>Justification: students</a:t>
+            </a:r>
+          </a:p>
+          <a:p>
+            <a:r>
+              <a:rPr lang="en-US" dirty="0" smtClean="0"/>
+              <a:t>Some code reuse is anticipated so adjusted effort = NOP</a:t>
+            </a:r>
+          </a:p>
+          <a:p>
+            <a:pPr lvl="1"/>
+            <a:r>
+              <a:rPr lang="en-US" dirty="0" smtClean="0"/>
+              <a:t>NOP = (34 </a:t>
+            </a:r>
+            <a:r>
+              <a:rPr lang="en-US" dirty="0" err="1" smtClean="0"/>
+              <a:t>obj</a:t>
+            </a:r>
+            <a:r>
+              <a:rPr lang="en-US" dirty="0" smtClean="0"/>
+              <a:t> </a:t>
+            </a:r>
+            <a:r>
+              <a:rPr lang="en-US" dirty="0" err="1" smtClean="0"/>
+              <a:t>pts</a:t>
+            </a:r>
+            <a:r>
+              <a:rPr lang="en-US" dirty="0" smtClean="0"/>
+              <a:t> x (100-.1)) / 100 = 33.97</a:t>
+            </a:r>
+            <a:endParaRPr lang="en-US" dirty="0" smtClean="0"/>
+          </a:p>
+          <a:p>
+            <a:r>
+              <a:rPr lang="en-US" dirty="0" smtClean="0"/>
+              <a:t>Effort Estimate in person months (PM) (PM = 32)</a:t>
+            </a:r>
+          </a:p>
+          <a:p>
+            <a:pPr lvl="1"/>
+            <a:r>
+              <a:rPr lang="en-US" dirty="0" smtClean="0"/>
+              <a:t>Effort(PM) = 33.97/7 = 4.85 person months</a:t>
+            </a:r>
+          </a:p>
+          <a:p>
+            <a:r>
+              <a:rPr lang="en-US" dirty="0" smtClean="0"/>
+              <a:t>Effort in Calendar Schedule</a:t>
+            </a:r>
+          </a:p>
+          <a:p>
+            <a:pPr lvl="1"/>
+            <a:r>
+              <a:rPr lang="en-US" dirty="0" err="1" smtClean="0"/>
+              <a:t>Fisal</a:t>
+            </a:r>
+            <a:r>
+              <a:rPr lang="en-US" dirty="0" smtClean="0"/>
+              <a:t> @ 9 hours per week</a:t>
+            </a:r>
+          </a:p>
+          <a:p>
+            <a:pPr lvl="1"/>
+            <a:r>
+              <a:rPr lang="en-US" dirty="0" smtClean="0"/>
+              <a:t>Kylie @ </a:t>
+            </a:r>
+            <a:r>
               <a:rPr lang="en-US" dirty="0"/>
-              <a:t>Productivity (PROD)</a:t>
+              <a:t>9 hours per week</a:t>
             </a:r>
           </a:p>
           <a:p>
             <a:pPr lvl="1"/>
             <a:r>
+              <a:rPr lang="en-US" dirty="0" smtClean="0"/>
+              <a:t>Cory @ </a:t>
+            </a:r>
+            <a:r>
               <a:rPr lang="en-US" dirty="0"/>
-              <a:t>PROD estimate is normal (10)</a:t>
+              <a:t>9 hours per week</a:t>
             </a:r>
           </a:p>
           <a:p>
             <a:pPr lvl="1"/>
             <a:r>
+              <a:rPr lang="en-US" dirty="0" smtClean="0"/>
+              <a:t>Morgan @ </a:t>
+            </a:r>
+            <a:r>
               <a:rPr lang="en-US" dirty="0"/>
-              <a:t>PROD = 160 NOP / 16 person months</a:t>
+              <a:t>9 hours per week</a:t>
             </a:r>
           </a:p>
           <a:p>
             <a:pPr lvl="1"/>
             <a:r>
+              <a:rPr lang="en-US" dirty="0" err="1" smtClean="0"/>
+              <a:t>Cyler</a:t>
+            </a:r>
+            <a:r>
+              <a:rPr lang="en-US" dirty="0" smtClean="0"/>
+              <a:t> @ </a:t>
+            </a:r>
+            <a:r>
               <a:rPr lang="en-US" dirty="0"/>
-              <a:t>PM = 4hr x 1 week x 4 weeks</a:t>
+              <a:t>9 hours per week</a:t>
             </a:r>
           </a:p>
           <a:p>
             <a:pPr lvl="1"/>
             <a:r>
+              <a:rPr lang="en-US" dirty="0" err="1" smtClean="0"/>
+              <a:t>Bijan</a:t>
+            </a:r>
+            <a:r>
+              <a:rPr lang="en-US" smtClean="0"/>
+              <a:t> @ </a:t>
+            </a:r>
+            <a:r>
               <a:rPr lang="en-US" dirty="0"/>
-              <a:t>Justification: students</a:t>
-            </a:r>
-          </a:p>
-          <a:p>
-            <a:r>
-              <a:rPr lang="en-US" dirty="0"/>
-              <a:t>Some code reuse is anticipated so adjusted effort = NOP</a:t>
+              <a:t>9 hours per </a:t>
+            </a:r>
+            <a:r>
+              <a:rPr lang="en-US" dirty="0" smtClean="0"/>
+              <a:t>week</a:t>
             </a:r>
           </a:p>
           <a:p>
             <a:pPr lvl="1"/>
             <a:r>
-              <a:rPr lang="en-US" dirty="0"/>
-              <a:t>NOP = (160 </a:t>
-            </a:r>
-            <a:r>
-              <a:rPr lang="en-US" dirty="0" err="1"/>
-              <a:t>Obj</a:t>
-            </a:r>
-            <a:r>
-              <a:rPr lang="en-US" dirty="0"/>
-              <a:t> </a:t>
-            </a:r>
-            <a:r>
-              <a:rPr lang="en-US" dirty="0" err="1"/>
-              <a:t>pts</a:t>
-            </a:r>
-            <a:r>
-              <a:rPr lang="en-US" dirty="0"/>
-              <a:t> x (100-0.1)) / 100 = 159.8</a:t>
-            </a:r>
-          </a:p>
-          <a:p>
-            <a:r>
-              <a:rPr lang="en-US" dirty="0"/>
-              <a:t>Effort Estimate in person months (PM) (PM = 16)</a:t>
-            </a:r>
-          </a:p>
-          <a:p>
-            <a:r>
-              <a:rPr lang="en-US" dirty="0"/>
-              <a:t>Effort(PM) = 159/10 = 15.9 person </a:t>
-            </a:r>
-            <a:r>
-              <a:rPr lang="en-US" dirty="0" err="1" smtClean="0"/>
-              <a:t>months</a:t>
-            </a:r>
-            <a:r>
-              <a:rPr lang="en-US" dirty="0" err="1"/>
-              <a:t>Productivity</a:t>
-            </a:r>
-            <a:r>
-              <a:rPr lang="en-US" dirty="0"/>
-              <a:t> (PROD)</a:t>
-            </a:r>
+              <a:rPr lang="en-US" dirty="0" smtClean="0"/>
+              <a:t>54 hours total per week</a:t>
+            </a:r>
+            <a:endParaRPr lang="en-US" dirty="0"/>
           </a:p>
           <a:p>
             <a:pPr lvl="1"/>
             <a:r>
-              <a:rPr lang="en-US" dirty="0"/>
-              <a:t>PROD estimate is normal (10)</a:t>
+              <a:rPr lang="en-US" dirty="0" smtClean="0"/>
+              <a:t>216 hours (54x4) per month on the project</a:t>
             </a:r>
           </a:p>
           <a:p>
             <a:pPr lvl="1"/>
             <a:r>
-              <a:rPr lang="en-US" dirty="0"/>
-              <a:t>PROD = 160 NOP / 16 person months</a:t>
-            </a:r>
-          </a:p>
-          <a:p>
-            <a:pPr lvl="1"/>
-            <a:r>
-              <a:rPr lang="en-US" dirty="0"/>
-              <a:t>PM = 4hr x 1 week x 4 weeks</a:t>
-            </a:r>
-          </a:p>
-          <a:p>
-            <a:pPr lvl="1"/>
-            <a:r>
-              <a:rPr lang="en-US" dirty="0"/>
-              <a:t>Justification: students</a:t>
-            </a:r>
-          </a:p>
-          <a:p>
-            <a:r>
-              <a:rPr lang="en-US" dirty="0"/>
-              <a:t>Some code reuse is anticipated so adjusted effort = NOP</a:t>
-            </a:r>
-          </a:p>
-          <a:p>
-            <a:pPr lvl="1"/>
-            <a:r>
-              <a:rPr lang="en-US" dirty="0"/>
-              <a:t>NOP = (160 </a:t>
-            </a:r>
-            <a:r>
-              <a:rPr lang="en-US" dirty="0" err="1"/>
-              <a:t>Obj</a:t>
-            </a:r>
-            <a:r>
-              <a:rPr lang="en-US" dirty="0"/>
-              <a:t> </a:t>
-            </a:r>
-            <a:r>
-              <a:rPr lang="en-US" dirty="0" err="1"/>
-              <a:t>pts</a:t>
-            </a:r>
-            <a:r>
-              <a:rPr lang="en-US" dirty="0"/>
-              <a:t> x (100-0.1)) / 100 = 159.8</a:t>
-            </a:r>
-          </a:p>
-          <a:p>
-            <a:r>
-              <a:rPr lang="en-US" dirty="0"/>
-              <a:t>Effort Estimate in person months (PM) (PM = 16)</a:t>
-            </a:r>
-          </a:p>
-          <a:p>
-            <a:pPr lvl="1"/>
-            <a:r>
-              <a:rPr lang="en-US" dirty="0"/>
-              <a:t>Effort(PM) = 159/10 = 15.9 person </a:t>
-            </a:r>
-            <a:r>
               <a:rPr lang="en-US" dirty="0" smtClean="0"/>
-              <a:t>months</a:t>
+              <a:t>3.59 months </a:t>
+            </a:r>
+            <a:r>
+              <a:rPr lang="mr-IN" dirty="0" smtClean="0"/>
+              <a:t>–</a:t>
+            </a:r>
+            <a:r>
+              <a:rPr lang="en-US" dirty="0" smtClean="0"/>
+              <a:t> (160 hours/person month x 4.85 person months) / 216 hours/month</a:t>
             </a:r>
             <a:endParaRPr lang="en-US" dirty="0"/>
           </a:p>
@@ -8570,15 +8497,7 @@
           <a:p>
             <a:r>
               <a:rPr lang="en-US" dirty="0" smtClean="0"/>
-              <a:t>April </a:t>
-            </a:r>
-            <a:r>
-              <a:rPr lang="en-US" dirty="0" smtClean="0"/>
-              <a:t>19, </a:t>
-            </a:r>
-            <a:r>
-              <a:rPr lang="en-US" dirty="0" smtClean="0"/>
-              <a:t>2017</a:t>
+              <a:t>April 19, 2017</a:t>
             </a:r>
             <a:endParaRPr lang="en-US" dirty="0"/>
           </a:p>
@@ -8609,7 +8528,7 @@
   <p:timing>
     <p:tnLst>
       <p:par>
-        <p:cTn id="1" dur="indefinite" restart="never" nodeType="tmRoot"/>
+        <p:cTn xmlns:p14="http://schemas.microsoft.com/office/powerpoint/2010/main" id="1" dur="indefinite" restart="never" nodeType="tmRoot"/>
       </p:par>
     </p:tnLst>
   </p:timing>
@@ -8878,7 +8797,7 @@
   <a:extraClrSchemeLst/>
   <a:extLst>
     <a:ext uri="{05A4C25C-085E-4340-85A3-A5531E510DB2}">
-      <thm15:themeFamily xmlns:thm15="http://schemas.microsoft.com/office/thememl/2012/main" name="Company background presentation" id="{7C18907C-4901-42BD-8F2C-E63B32C9DCA3}" vid="{B4FC953D-0C69-4290-95E2-4EA0E2E67DEC}"/>
+      <thm15:themeFamily xmlns:thm15="http://schemas.microsoft.com/office/thememl/2012/main" xmlns="" name="Company background presentation" id="{7C18907C-4901-42BD-8F2C-E63B32C9DCA3}" vid="{B4FC953D-0C69-4290-95E2-4EA0E2E67DEC}"/>
     </a:ext>
   </a:extLst>
 </a:theme>
@@ -9139,7 +9058,7 @@
   <a:extraClrSchemeLst/>
   <a:extLst>
     <a:ext uri="{05A4C25C-085E-4340-85A3-A5531E510DB2}">
-      <thm15:themeFamily xmlns:thm15="http://schemas.microsoft.com/office/thememl/2012/main" name="Office Theme" id="{62F939B6-93AF-4DB8-9C6B-D6C7DFDC589F}" vid="{4A3C46E8-61CC-4603-A589-7422A47A8E4A}"/>
+      <thm15:themeFamily xmlns:thm15="http://schemas.microsoft.com/office/thememl/2012/main" xmlns="" name="Office Theme" id="{62F939B6-93AF-4DB8-9C6B-D6C7DFDC589F}" vid="{4A3C46E8-61CC-4603-A589-7422A47A8E4A}"/>
     </a:ext>
   </a:extLst>
 </a:theme>
@@ -9400,7 +9319,7 @@
   <a:extraClrSchemeLst/>
   <a:extLst>
     <a:ext uri="{05A4C25C-085E-4340-85A3-A5531E510DB2}">
-      <thm15:themeFamily xmlns:thm15="http://schemas.microsoft.com/office/thememl/2012/main" name="Office Theme" id="{62F939B6-93AF-4DB8-9C6B-D6C7DFDC589F}" vid="{4A3C46E8-61CC-4603-A589-7422A47A8E4A}"/>
+      <thm15:themeFamily xmlns:thm15="http://schemas.microsoft.com/office/thememl/2012/main" xmlns="" name="Office Theme" id="{62F939B6-93AF-4DB8-9C6B-D6C7DFDC589F}" vid="{4A3C46E8-61CC-4603-A589-7422A47A8E4A}"/>
     </a:ext>
   </a:extLst>
 </a:theme>

</xml_diff>